<commit_message>
work on other computher
</commit_message>
<xml_diff>
--- a/Documents/Layout.pptx
+++ b/Documents/Layout.pptx
@@ -6,6 +6,7 @@
   </p:sldMasterIdLst>
   <p:sldIdLst>
     <p:sldId id="256" r:id="rId2"/>
+    <p:sldId id="257" r:id="rId3"/>
   </p:sldIdLst>
   <p:sldSz cx="12192000" cy="6858000"/>
   <p:notesSz cx="6858000" cy="9144000"/>
@@ -137,7 +138,7 @@
     </inkml:brush>
   </inkml:definitions>
   <inkml:trace contextRef="#ctx0" brushRef="#br0">9529 1940 16000,'-1331'75'-640,"501"-77"579,4-31 20,-550-5 15,1116 40 26,-980-17 0,455-10 0,577 30 0,1 8 0,-154 33 0,319-39 0,1 1 0,0 2 0,1 2 0,0 2 0,1 1 0,-3 4 0,30-13 0,1 0 0,-1 1 0,1 1 0,0 0 0,1 0 0,0 1 0,0 1 0,1-1 0,0 1 0,1 1 0,0 0 0,1 0 0,0 1 0,0-1 0,1 1 0,1 1 0,0-1 0,1 1 0,0 0 0,-1 11 0,1 6 4,2-1 0,0 1 0,2-1 0,2 1 0,0-1 0,5 16-4,13 54 72,11 28-72,-14-61 32,54 228 288,-13 4 0,-12 18-320,27 858 1124,-61-868-841,19 387 195,15 369-38,-19 144-18,-48 0-226,-89 380 316,-113 306-512,35-338 235,177-1434-212,-53 785-46,64-902 21,-1 0 1,1-1-1,0 1 0,0 0 0,0 0 0,0 0 1,1-1-1,-1 1 0,1 0 0,0 0 1,0-1-1,0 1 0,0-1 0,0 1 0,0-1 1,1 1-1,-1-1 0,1 0 0,0 0 1,0 1-1,0-1 0,0 0 0,0-1 1,0 1-1,0 0 0,0-1 0,1 1 0,-1-1 1,1 0-1,-1 1 0,1-1 0,-1-1 1,1 1-1,0 0 0,0-1 0,-1 1 0,1-1 1,1 0 1,11 1-7,0-2 1,0 0-1,0-1 1,0-1-1,0 0 1,8-3 6,-17 4-1,199-47 1,3 8 0,0 10 0,58 4 0,92 15 0,53 17 0,776-24 117,-920 9-106,1017-65 267,-850 46-55,280-24 23,-480 29-212,722-64 188,-887 83-235,549-54 109,-507 41-464,0-4 1,-1-6 0,-1-4-1,44-22 368,-15-4-3029,-2 2-8021</inkml:trace>
-  <inkml:trace contextRef="#ctx0" brushRef="#br0" timeOffset="635.301">10747 2454 17663,'168'1063'0,"-55"3"0,-58 639 707,-11-169 80,136 562 395,146-27-252,-215-1557-711,10 53-54,-26 0-59,-76-408-370,24 177-2992,-10-116-9223</inkml:trace>
+  <inkml:trace contextRef="#ctx0" brushRef="#br0" timeOffset="635.3">10747 2454 17663,'168'1063'0,"-55"3"0,-58 639 707,-11-169 80,136 562 395,146-27-252,-215-1557-711,10 53-54,-26 0-59,-76-408-370,24 177-2992,-10-116-9223</inkml:trace>
   <inkml:trace contextRef="#ctx0" brushRef="#br0" timeOffset="34467.882">1893 3992 10496,'27'-20'-3,"0"0"0,0 2 0,2 1-1,0 2 1,1 0 0,1 2 0,9-2 3,42-6-5,0 3-1,66-4 6,169-6 259,-226 22-229,1194-79 716,180-2-237,2 27-79,651-21 679,-1387 51-704,-226 8-1229,-169 9-3002,-197 8-2019</inkml:trace>
   <inkml:trace contextRef="#ctx0" brushRef="#br0" timeOffset="48992.67">7717 2411 12032,'-12'0'0,"0"-1"0,0 1 0,0-2 0,0 0 0,-11-3 0,-15-3 23,0 2 1,0 1-1,0 3 0,-1 1 1,-22 2-24,8 0 11,19-1-11,-60 0 0,-92 11 0,-210 30 108,52-7 40,-96 10 214,-58-17-362,410-25 14,-279 11 100,148-2-39,-2-9 0,-126-18-75,252 7 117,-1 4 0,-48 5-117,102 3 9,-59 3 110,-53-6-119,54-4 27,-28 6-27,82 1-2,1 2 0,-1 2 1,-41 12 1,18 2 36,36-10 10,-1-2 0,-23 3-46,55-11 0,1-1 0,-1 0 0,0 0 0,1 0 0,-1-1 0,1 1 0,-1 0 0,0-1 0,1 1 0,-1 0 0,1-1 0,-1 0 0,1 1 0,-1-1 0,1 0 0,1 1 0,-1-1 0,0 1 0,0-1 0,1 1 0,-1 0 0,0-1 0,0 1 0,0 0 0,1 0 0,-1 0 0,0 0 0,0 0 0,0 0 0,0 0 0,1 0 0,-1 0 0,0 0 0,0 0 0,0 0 0,0 1 0,1-1 0,-1 0 0,0 1 0,0-1 0,1 0 0,-1 1 0,0-1 0,-9 6-8,0-1 1,0 0-1,0-1 1,-1 0 0,0-1-1,1 0 1,-10 1 7,12-3-6,0 0 1,-1 1-1,1 0 1,0 1 0,1 0-1,-1 0 1,0 0-1,1 1 1,0 0-1,0 1 1,0 0-1,0 0 1,1 0 0,-1 1 5,4-2 1,0 1 0,0-1 0,1 1 0,-1 0 0,1 0 0,0 0 0,0 0 0,1 1 0,0-1 0,-1 0 0,2 1 1,-1-1-1,1 0 0,0 1 0,0-1 0,0 1 0,1 2-1,3 17 18,0-1 1,2 1-1,4 9-18,6 28 55,-10-19 24,-1 1 1,-3-1-1,-1 1 1,-2-1-1,-2 1 1,-2-1-1,-2 0 1,-2-1-1,-2 0 1,-1 0-1,-10 20-79,20-59 3,1 0-1,0 0 1,0 0-1,1 0 1,-1 0-1,0 1 0,1-1 1,0 0-1,0 0 1,0 0-1,0 3-2,1-5 5,-1 1 0,1-1-1,-1 0 1,1 1 0,0-1 0,0 0-1,0 0 1,0 0 0,-1 0-1,1 0 1,1 0 0,-1 0-1,0 0 1,0 0 0,0 0 0,0 0-1,1 0 1,-1-1 0,0 1-1,1-1 1,-1 1 0,0-1-1,1 1 1,-1-1 0,1 0 0,0 0-5,6 1 17,0-1 0,0 0 0,1 0 0,-1-1 0,0 0 0,0 0 0,0-1 0,0 0 1,0 0-1,5-3-17,23-5 63,69-8-55,0 5 1,1 4-1,2 5-8,63-6-3,259-18 55,121-9 24,-451 29-76,396-28 0,399-34 7,-762 57 7,171-23 104,80-7 20,-317 38-114,39-2 59,98-21-83,-23-5 21,48 3-21,-226 30 11,-1 0 0,1-1 1,-1 1-1,0 0 0,0-1 0,1 1 1,-1-1-1,0 0 0,0 0 0,0 0 1,0 0-1,0 0 0,0 0 0,0-1 1,0 1-1,2-2-11,-2 0 18,-1 0 0,1 0 1,-1 0-1,1-1 0,-1 1 0,0 0 1,0-1-1,0 1 0,-1-1 1,1-2-19,4-30 44,-2-1 1,-1 0 0,-2 1 0,-1-1 0,-3-5-45,-6-34 160,-18-69-160,22 120-43,0 0 0,-1 0 1,-1 0-1,-2 1 0,0 1 1,-2 0-1,-8-13 43,19 34-269,-14-12-3793,10 12-3468</inkml:trace>
   <inkml:trace contextRef="#ctx0" brushRef="#br0" timeOffset="49554.17">8449 2481 5248,'-51'-25'-38,"-39"-13"38,69 31 212,0 0 1,0 2-1,0 0 1,-1 2 0,0 0-1,-1 1-212,17 3 136,0-1 0,1 1 0,-1 0-1,0 0 1,1 0 0,-1 1 0,1 0 0,-1 0 0,1 0-1,0 1 1,0 0 0,0 0 0,0 0 0,1 0 0,-1 1-1,1 0 1,0 0 0,0 0 0,0 0 0,0 1-1,1 0 1,0-1 0,0 1 0,-2 5-136,-5 9 310,1 1 0,1 0 0,1 0 0,0 1 0,2 0 0,0 5-310,0-5 54,2 0 0,1 0 0,0 1 0,2-1 0,0 0 0,1 1 0,2-1 0,0 0 0,1 0 0,1 0 0,1 0-1,1-1 1,0 0 0,2 0 0,0-1 0,1 0 0,5 4-54,-10-17 27,-1 0 0,2-1 0,-1 1 1,1-1-1,0-1 0,0 1 0,0-1 0,0 0 0,1 0 0,0-1 0,0 0 0,0 0 0,0-1 0,0 1 0,0-2 0,1 1 0,-1-1 1,1 0-1,-1 0 0,7-1-27,7 0 66,0-1 0,0 0 0,-1-2 1,1 0-1,0-1 0,17-7-66,-22 6 51,0-1 0,-1 0 1,1-1-1,-1-1 0,-1-1 0,1 0 0,-2 0 1,1-2-1,-1 0 0,-1 0 0,0-1 0,-1 0 1,0-1-1,-1-1 0,0 0 0,-1 0 0,0 0 1,-2-1-1,0-1 0,1-3-51,-5 9 58,-1-1 0,-1 1-1,0 0 1,0-1 0,-1 1 0,0 0 0,-1-1 0,0 1 0,-1-1 0,0 1-1,0 0 1,-1 0 0,-1 0 0,1 1 0,-2-1 0,1 1 0,-6-8-58,-6-10 114,-2 1 1,0 1 0,-2 0-1,0 1 1,-11-7-115,17 17-36,-7-7-840,0 1 0,-6-3 876,18 16-1174,1 1 0,-1 1 0,-1 0 0,1 0 0,-1 0 1174,-23-9-4928</inkml:trace>
@@ -158,7 +159,7 @@
   <inkml:trace contextRef="#ctx0" brushRef="#br0" timeOffset="74333.458">4650 6260 7552,'3'0'384,"202"-14"1792,-53 4-1619,60-1-69,1155-48 1645,-916 40-1471,109 23-662,-249 3 512,281-30-512,-281-10 198,254-18-34,-513 51-1243,0 2 1,15 5 1078,-54-6-893,36 4-6915</inkml:trace>
   <inkml:trace contextRef="#ctx0" brushRef="#br0" timeOffset="74851.815">4872 6888 13952,'170'-29'0,"15"-2"0,-38 20 64,143 10-64,-110 3 64,133-5 190,400 2 846,-1 36-406,449 18-55,-938-55-148,22-11-491,-208 10 107,1 1-1,0 2 1,0 2 0,-1 2-1,5 2-106,-10-5 125,-15-3-237,-17 2 96,1 0 0,-1 0 0,0 0 0,0 0 0,1 0 0,-1 0 0,0-1 0,0 1 0,1 0 0,-1 0 0,0 0 0,0 0 0,0 0-1,1-1 1,-1 1 0,0 0 0,0 0 0,0 0 0,0 0 0,1-1 0,-1 1 0,0 0 0,0 0 0,0-1 0,0 1 0,0 0 0,0 0 0,0 0 0,1-1 0,-1 1 0,0 0 0,0 0-1,0-1 1,0 1 0,0 0 0,0 0 0,0-1 0,0 1 16,-1-1-122,1 1-1,-1-1 1,1 1-1,-1-1 1,1 1-1,-1-1 1,1 1-1,-1-1 0,1 1 1,-1 0-1,0-1 1,1 1-1,-1 0 1,0-1-1,1 1 1,-1 0-1,0 0 1,1 0-1,-1 0 1,0 0-1,1-1 1,-1 1-1,0 0 1,0 1-1,0-1 123,-22 1-1855,16 0 651,-32 1-5772</inkml:trace>
   <inkml:trace contextRef="#ctx0" brushRef="#br0" timeOffset="80287.231">9800 5961 9600,'9'5'0,"2"5"0,-9-5 0,-4-2 0,2-3 0,-8 6-128,8-6 128,0 0-6656</inkml:trace>
-  <inkml:trace contextRef="#ctx0" brushRef="#br0" timeOffset="81708.262">8882 8341 12544,'-630'-86'240,"286"45"-118,-197-23 28,-361 12-150,-766 79-768,1576-22 674,-594 26-421,-1-34 249,-155-40 373,492 20 149,325 22-231,0 1-1,0 2 1,1 0 0,-1 1 0,0 2 0,-10 3-25,32-7 8,-1 0 0,0 0 0,0 1 0,1 0 0,-1-1 0,1 1 0,-1 1 0,1-1 1,0 0-1,0 1 0,-2 1-8,4-3 3,1 0 1,-1 1-1,0-1 1,1 0-1,-1 0 0,1 0 1,-1 0-1,1 1 1,-1-1-1,1 0 1,0 1-1,0-1 1,0 0-1,0 0 1,0 1-1,0-1 1,0 0-1,0 1 0,0-1 1,0 0-1,1 0 1,-1 1-1,1-1 1,-1 0-1,1 0 1,-1 0-1,1 1 1,0-1-1,-1 0 1,1 0-1,0 0 0,0 0 1,0 0-1,0 0 1,0-1-1,0 1-3,13 12 9,0 0 0,1-1 0,15 10-9,-11-10-3,-2 2 1,13 12 2,-10-5-16,-1 2 0,-1 1 0,-1 0 0,-1 1 0,-1 1 0,-1 0 0,-2 1 0,-1 0 0,0 1 0,-3 0 0,0 1 0,0 6 16,7 48-192,-4 0 0,-3 2 0,-4 56 192,-21 416-794,-1-144 1146,18-267-145,15 117-207,-8-209-247,2-1 1,2 0-1,3-1 1,2 0-1,2-1 1,3-1-1,1 0 1,3-2-1,21 31 247,47 69-5866</inkml:trace>
+  <inkml:trace contextRef="#ctx0" brushRef="#br0" timeOffset="81708.261">8882 8341 12544,'-630'-86'240,"286"45"-118,-197-23 28,-361 12-150,-766 79-768,1576-22 674,-594 26-421,-1-34 249,-155-40 373,492 20 149,325 22-231,0 1-1,0 2 1,1 0 0,-1 1 0,0 2 0,-10 3-25,32-7 8,-1 0 0,0 0 0,0 1 0,1 0 0,-1-1 0,1 1 0,-1 1 0,1-1 1,0 0-1,0 1 0,-2 1-8,4-3 3,1 0 1,-1 1-1,0-1 1,1 0-1,-1 0 0,1 0 1,-1 0-1,1 1 1,-1-1-1,1 0 1,0 1-1,0-1 1,0 0-1,0 0 1,0 1-1,0-1 1,0 0-1,0 1 0,0-1 1,0 0-1,1 0 1,-1 1-1,1-1 1,-1 0-1,1 0 1,-1 0-1,1 1 1,0-1-1,-1 0 1,1 0-1,0 0 0,0 0 1,0 0-1,0 0 1,0-1-1,0 1-3,13 12 9,0 0 0,1-1 0,15 10-9,-11-10-3,-2 2 1,13 12 2,-10-5-16,-1 2 0,-1 1 0,-1 0 0,-1 1 0,-1 1 0,-1 0 0,-2 1 0,-1 0 0,0 1 0,-3 0 0,0 1 0,0 6 16,7 48-192,-4 0 0,-3 2 0,-4 56 192,-21 416-794,-1-144 1146,18-267-145,15 117-207,-8-209-247,2-1 1,2 0-1,3-1 1,2 0-1,2-1 1,3-1-1,1 0 1,3-2-1,21 31 247,47 69-5866</inkml:trace>
   <inkml:trace contextRef="#ctx0" brushRef="#br0" timeOffset="82170.545">6224 10994 15744,'-9'32'0,"-7"23"0,19 9 0,7 2-2688,2 23 0,-1 11-1920,-1-10 0,2 2 5376</inkml:trace>
   <inkml:trace contextRef="#ctx0" brushRef="#br0" timeOffset="82320.579">6212 12329 17151,'-2'-15'0,"-1"-12"0,-2 64 0,0 1-12415</inkml:trace>
   <inkml:trace contextRef="#ctx0" brushRef="#br0" timeOffset="82470.499">5929 13591 17919,'8'8'0,"0"-1"-13055</inkml:trace>
@@ -176,18 +177,18 @@
   <inkml:trace contextRef="#ctx0" brushRef="#br0" timeOffset="110058.157">9757 2785 17535,'0'0'128,"0"0"0,0 0 0,93-10 0,-33 2 0,5-2 0,4 3 0,1-3-256,1 1 128,-2-1-2175,-18 5-1,1 0-7296</inkml:trace>
   <inkml:trace contextRef="#ctx0" brushRef="#br0" timeOffset="110306.491">9844 2454 15104,'0'0'256,"-9"-3"128,-4-7-128,5 8 0,3 2 127,10 25 129,10 15-256,8 10 0,10 12-128,1 3 128,1 9-256,3-2 0,2 3-4991,2-15-1,-2 3 640</inkml:trace>
   <inkml:trace contextRef="#ctx0" brushRef="#br0" timeOffset="145601.8">18591 3576 9728,'25'41'384,"-25"-41"-378,0 0 0,0 0 0,0 0 1,0 0-1,0 0 0,0 1 0,0-1 1,0 0-1,0 0 0,0 0 0,0 0 1,0 0-1,0 0 0,1 1 0,-1-1 1,0 0-1,0 0 0,0 0 0,0 0 0,0 0 1,0 0-1,0 0 0,1 0 0,-1 0 1,0 0-1,0 1 0,0-1 0,0 0 1,0 0-1,1 0 0,-1 0 0,0 0 1,0 0-1,0 0 0,0 0 0,0 0 1,1 0-1,-1 0 0,0 0 0,0 0 0,0 0 1,0 0-1,0 0 0,1-1 0,-1 1 1,0 0-1,0 0 0,0 0 0,0 0 1,0 0-1,0 0 0,1 0 0,-1 0 1,0 0-1,0-1 0,0 1 0,0 0 1,0 0-1,0 0 0,0 0 0,0 0 0,0 0 1,0-1-1,0 1-6,2-10 100,-1 9 190,8 65 126,-3 1-1,-2 0 1,-4 0 0,-2 1-416,1 36 342,2-57-411,4-16-3744,-1-18-1883</inkml:trace>
-  <inkml:trace contextRef="#ctx0" brushRef="#br0" timeOffset="145998.885">18754 3693 10112,'71'-8'460,"-1"-2"1,0-4-1,31-12-460,48-10 1008,-116 29-834,0 2 0,1 1 1,0 2-1,-1 1 0,1 1 0,0 2 0,0 2 1,-1 1-1,0 2 0,0 0 0,0 3 1,16 7-175,-43-14 69,0 0 0,0 1 0,0 0 0,0 0 1,-1 1-1,0 0 0,0-1 0,0 2 0,0-1 1,-1 0-1,0 1 0,0 0 0,0 0 0,-1 0 1,0 1-1,0-1 0,0 1 0,1 6-69,3 15 100,0 0 1,-2 0-1,-2 1 0,0 0-100,-2-19 39,3 58 153,-4 0 0,-2 0 0,-9 55-192,3-90-3371,3-19-5631</inkml:trace>
+  <inkml:trace contextRef="#ctx0" brushRef="#br0" timeOffset="145998.883">18754 3693 10112,'71'-8'460,"-1"-2"1,0-4-1,31-12-460,48-10 1008,-116 29-834,0 2 0,1 1 1,0 2-1,-1 1 0,1 1 0,0 2 0,0 2 1,-1 1-1,0 2 0,0 0 0,0 3 1,16 7-175,-43-14 69,0 0 0,0 1 0,0 0 0,0 0 1,-1 1-1,0 0 0,0-1 0,0 2 0,0-1 1,-1 0-1,0 1 0,0 0 0,0 0 0,-1 0 1,0 1-1,0-1 0,0 1 0,1 6-69,3 15 100,0 0 1,-2 0-1,-2 1 0,0 0-100,-2-19 39,3 58 153,-4 0 0,-2 0 0,-9 55-192,3-90-3371,3-19-5631</inkml:trace>
   <inkml:trace contextRef="#ctx0" brushRef="#br0" timeOffset="146233.258">18667 4335 12544,'0'0'0,"0"0"128,0 0 0,0 0 0,17-2 128,13-6 256,22 1 128,16-3-384,7-5 0,10-9-128,13 8 128,9-8-256,-4 8 0,1-4-11008</inkml:trace>
-  <inkml:trace contextRef="#ctx0" brushRef="#br0" timeOffset="146982.828">20391 3942 13824,'0'0'0,"0"0"0,0 0 0,56-20 0,-26 12 128,-3 1-128,3-1 128,-2 3-128,-4 0 128,-4-2-128,-7 2 128,-1 2-128,-4 1 0,-6-3-2176,-4-3 0,-1 1-4352</inkml:trace>
+  <inkml:trace contextRef="#ctx0" brushRef="#br0" timeOffset="146982.827">20391 3942 13824,'0'0'0,"0"0"0,0 0 0,56-20 0,-26 12 128,-3 1-128,3-1 128,-2 3-128,-4 0 128,-4-2-128,-7 2 128,-1 2-128,-4 1 0,-6-3-2176,-4-3 0,-1 1-4352</inkml:trace>
   <inkml:trace contextRef="#ctx0" brushRef="#br0" timeOffset="147154.719">20489 3723 12800,'10'14'0,"10"2"128,-12-6 128,-3-1 256,0 1 128,-1 0-256,1 15 0,0 2-128,1 6 0,1 2-128,-4 2 128,1 3-256,-4-7 0,-4-6-1152,4-9 0,0-1-8448</inkml:trace>
   <inkml:trace contextRef="#ctx0" brushRef="#br0" timeOffset="147800.757">20837 3543 13824,'7'114'382,"-3"-70"-51,-1-1 1,-3 5-332,-11 92 1088,-26 121-1088,32-291-785,1 14 461,-17-86-1384,13 68 1142,1 0-1,2 0 1,1 0-1,1 0 1,2-21 566,2 46 136,0-1 1,0 1-1,1 0 1,0 0-1,1 0 1,0 0 0,0 0-1,1 0 1,0 1-1,0-1 1,1 1-1,0 0 1,1 1-1,0-1 1,0 1-1,1 0 1,-1 1-1,1 0 1,1 0 0,-1 0-1,1 1 1,4-2-137,7-4 243,0 1 1,0 1 0,1 1-1,1 0 1,-1 2 0,1 0-1,0 2 1,0 0 0,1 1 0,-1 2-1,15 0-243,-20 1 85,1 1-1,-1 1 0,0 1 1,1 0-1,-1 1 1,-1 1-1,1 0 0,-1 1 1,0 1-1,0 1 1,-1 0-1,1 0 0,-2 2 1,0 0-1,7 6-84,-9-6 68,0 1 0,0 0-1,-1 1 1,0 0 0,-1 1 0,-1 0-1,0 0 1,-1 1 0,0 0 0,-1 0 0,-1 1-1,0 0 1,-1 0 0,0 0 0,-2 0-1,1 0 1,-1 14-68,-3-23 7,1-1 0,-1 1 0,-1-1 0,1 1 0,-1-1 0,0 0 0,0 1 0,0-1 0,-1 0 0,0 0 0,0 0-1,0-1 1,0 1 0,-1-1 0,0 0 0,0 0 0,0 0 0,0 0 0,-4 1-7,-13 10-140,0-1 1,-1-1-1,-19 9 140,22-13-140,-12 6-191,0-1 0,-1-2-1,0-2 1,-1 0 0,-29 3 331,-8-2-142,0-4-1,-24-2 143,89-6 499,21-1-144,45-11 220,89-38-70,127-38-2695,-203 70-8604</inkml:trace>
   <inkml:trace contextRef="#ctx0" brushRef="#br0" timeOffset="150181.919">19997 4964 9984,'-137'-36'1514,"129"35"-1511,-1 0 0,1 1-1,0 0 1,0 1 0,0 0-1,0 0 1,0 1 0,-6 1-3,-31 6 0,-370 41 57,-76 8-881,258-39-1033,-27-10 1857,-21-9-1088,-261-35 1088,530 33-46,-1 0 1,1 1 0,-1 1-1,1 0 1,0 1 0,-1 0-1,1 0 1,-4 2 45,16-3-5,-1 1-1,1-1 0,-1 0 1,1 0-1,-1 0 1,1 0-1,-1 0 0,1 1 1,0-1-1,-1 0 1,1 0-1,-1 1 1,1-1-1,0 0 0,-1 1 1,1-1-1,-1 0 1,1 1-1,0-1 0,0 0 1,-1 1-1,1-1 1,0 1-1,0-1 1,-1 1-1,1-1 6,8 7-331,20 1-110,-21-9 508,0 2 1,0-1 0,0 1-1,0 0 1,0 0 0,1 1-68,-5-1 106,0 0 1,0 1 0,0-1-1,0 1 1,0 0-1,-1 0 1,1 0 0,-1 0-1,1 0 1,-1 1 0,0-1-1,0 1 1,0-1-1,1 2-106,5 8 243,13 17 531,-2 1-1,7 15-773,-21-33 113,1 0-1,-2 0 0,0 0 0,0 0 1,-1 1-1,-1-1 0,0 1 0,0 10-112,-3 13 93,-1-1 0,-2 1 0,-1-1-1,-2 0 1,-2-1 0,-1 2-93,-13 60 105,21-91-96,1 0 1,0 0 0,0 0-1,1 0 1,-1 0 0,1 1 0,0-1-1,1 0 1,-1 0 0,1 0-1,1 5-9,-1-10 3,-1 0-1,1 1 1,0-1-1,-1 0 1,1 1-1,0-1 1,-1 0-1,1 0 1,0 1 0,0-1-1,-1 0 1,1 0-1,0 0 1,0 0-1,-1 0 1,1 0-1,0 0 1,0 0-1,-1 0 1,1-1-1,0 1 1,-1 0-1,1 0 1,0-1-1,0 1 1,-1 0-1,1-1 1,-1 1-1,1-1 1,0 1-1,-1-1-2,30-16 67,-26 14-62,38-21 27,1 1 0,14-3-32,-35 17 12,1 1 1,-1 2 0,1 0 0,1 1 0,18-1-13,293-26 223,495-55 834,-666 68-545,2 8 0,59 7-512,-213 4-30,0-2 0,0 1 1,0-1-1,0-1 1,0 0-1,0-1 1,-1 0-1,1-1 1,-1 0-1,0-1 1,-1 0-1,1 0 1,2-4 29,15-7-2198,1 2-5716</inkml:trace>
   <inkml:trace contextRef="#ctx0" brushRef="#br0" timeOffset="150427.271">20041 4902 9728,'0'15'0,"0"10"384,0 12 0,0 12 0,-9 7 128,-1 15 0,-3-1 0,-4 0-384,1-5 128,-3-2-384,4-11 128,2 2-9088</inkml:trace>
   <inkml:trace contextRef="#ctx0" brushRef="#br0" timeOffset="153363.417">21437 4879 11648,'-3'25'0,"1"15"128,2 9 0,0 6 256,2 6 128,5 8-128,-1-9 0,3 2-384,-3-12 128,-1-10-128,-1-7 128,-3-11-640,-1-4 128,0-2-8832</inkml:trace>
-  <inkml:trace contextRef="#ctx0" brushRef="#br0" timeOffset="153699.488">21546 4944 12672,'61'6'177,"1"-3"0,-1-3 0,1-3 0,55-9-177,-15 2 188,14 5-188,38 4 287,227-7 450,-371 8-722,-1-1 81,0 0 0,0 1 0,0 1-1,9 0-95,-16 0 21,0-1 0,0 1-1,0-1 1,0 1 0,0 0-1,0-1 1,0 1 0,0 0-1,-1 0 1,1 1 0,0-1 0,-1 0-1,1 0 1,-1 1 0,1-1-1,-1 1 1,0-1 0,1 1-1,-1 0 1,0 0 0,0-1-1,0 1 1,0 1-21,5 18 124,-1 0 0,-1 0 1,-1 0-1,-1 0 0,-1 1 0,-1 7-124,2 16 172,3 104-116,-5-85-2650,0-29-6771</inkml:trace>
+  <inkml:trace contextRef="#ctx0" brushRef="#br0" timeOffset="153699.487">21546 4944 12672,'61'6'177,"1"-3"0,-1-3 0,1-3 0,55-9-177,-15 2 188,14 5-188,38 4 287,227-7 450,-371 8-722,-1-1 81,0 0 0,0 1 0,0 1-1,9 0-95,-16 0 21,0-1 0,0 1-1,0-1 1,0 1 0,0 0-1,0-1 1,0 1 0,0 0-1,-1 0 1,1 1 0,0-1 0,-1 0-1,1 0 1,-1 1 0,1-1-1,-1 1 1,0-1 0,1 1-1,-1 0 1,0 0 0,0-1-1,0 1 1,0 1-21,5 18 124,-1 0 0,-1 0 1,-1 0-1,-1 0 0,-1 1 0,-1 7-124,2 16 172,3 104-116,-5-85-2650,0-29-6771</inkml:trace>
   <inkml:trace contextRef="#ctx0" brushRef="#br0" timeOffset="153978.075">21447 5510 13312,'17'-1'0,"8"-8"128,22 3 0,14-4 128,3 1 128,4 2 256,14 4 0,8 1-384,16-1 0,11 1-128,20-13 128,18-3-129,-19-2 1,-7 0-511,-21 3-1,2 2-11008</inkml:trace>
   <inkml:trace contextRef="#ctx0" brushRef="#br0" timeOffset="157013.925">19136 5649 7296,'-1'0'34,"0"0"1,1 1-1,-1-1 1,1 0-1,-1 0 0,1 0 1,-1 1-1,0-1 1,1 0-1,-1 0 1,0 0-1,1 0 1,-1 0-1,1 0 1,-1 0-1,0-1 0,1 1 1,-1 0-1,1 0 1,-1 0-1,0-1 1,1 1-1,-1 0 1,1-1-35,-18-1 453,-63 24 83,19-3-454,4-4-52,-8 3 30,-1-3 0,-56 4-60,25-7 206,0 4 0,1 4 0,-55 20-206,124-32 39,-17 6 5,-1-3 0,-13 1-44,44-9 33,0-2 0,0 0 1,-1-1-1,1 0 1,0-1-1,0-1 0,0 0 1,0-1-1,-3-2-33,11 3 15,-1 0 0,0 1 0,1 0 0,-1 0 0,0 0 0,0 1-1,0 0 1,0 1 0,0 0 0,0 0 0,1 1 0,-1 0 0,0 0 0,1 1 0,-2 0-15,-13 8 46,2 0 0,-1 1 0,2 1 0,-8 7-46,-17 11 595,43-30-582,1-1 1,-1 1-1,1-1 1,-1 1-1,1 0 1,-1-1 0,1 1-1,-1-1 1,1 1-1,0 0 1,-1-1-1,1 1 1,0 0-1,0-1 1,-1 1-1,1 0 1,0-1 0,0 1-1,0 0 1,0 0-1,0-1 1,0 1-1,0 0 1,0 0-1,0-1 1,0 1 0,1 0-1,-1-1 1,0 1-1,0 0 1,1-1-1,-1 1-13,14 24 244,-9-18-153,4 9 12,-1 1 0,0 0 0,-1 0 0,-1 1 1,-1 0-1,0 0 0,-1 1 0,-1-1 0,-1 1 0,-1-1 1,0 12-104,-3 23 212,-1 0-1,-3 0 1,-8 24-212,27-84 40,0 1-1,0 1 1,0 0-1,1 1-39,55-24-8,62-27 120,42-8-112,-35 13 122,-53 21-88,3 4 0,19-1-34,179-28 20,-146 30-321,-62 11-4435,19 2 4736,-22 3-5909</inkml:trace>
-  <inkml:trace contextRef="#ctx0" brushRef="#br0" timeOffset="157281.824">19126 5514 12288,'8'21'0,"2"13"0,3 12 0,4 10 0,0 9 0,-4 3 128,-1 4 128,-4 6-128,-3-12 0,-3-15-640,1-1 128,0 4-8064</inkml:trace>
+  <inkml:trace contextRef="#ctx0" brushRef="#br0" timeOffset="157281.822">19126 5514 12288,'8'21'0,"2"13"0,3 12 0,4 10 0,0 9 0,-4 3 128,-1 4 128,-4 6-128,-3-12 0,-3-15-640,1-1 128,0 4-8064</inkml:trace>
   <inkml:trace contextRef="#ctx0" brushRef="#br0" timeOffset="157994.609">17914 6711 11008,'13'11'148,"0"2"0,0-1 0,-1 1 0,-1 1 0,0 0 0,-1 1 0,0 0 0,-2 0 0,0 1 0,0 0 0,4 15-148,4 23 249,-2 0 0,-2 2 0,-2 8-249,-8-53 14,76 570 1181,-16 155-1195,-48-448 192,-13 1 0,-14 34-192,8-250 40,-12 128 77,12-160-99,-3-1 1,-1 1 0,-12 29-19,-43 89-896,64-158 706,-1 1-1,1 0 1,-1-1 0,0 1 0,1 0-1,-1-1 1,0 1 0,0-1 0,0 1-1,0-1 1,0 1 0,0-1 0,-1 0-1,1 0 1,0 0 0,-1 1 0,1-1-1,-1 0 191,1-2-206,0 1 0,0 0-1,0-1 1,-1 1 0,1-1-1,0 0 1,0 1-1,0-1 1,0 0 0,0 1-1,0-1 1,0 0 0,0 0-1,0 0 1,0 0 0,1 0-1,-1 0 1,0 0-1,1 0 1,-1-1 206,-21-28-3669</inkml:trace>
   <inkml:trace contextRef="#ctx0" brushRef="#br0" timeOffset="158514.618">17849 6748 12416,'0'-8'53,"0"1"0,0 0 1,1 0-1,0-1 0,0 1 1,0 0-1,1 0 0,1 0 1,0-3-54,0 6 34,-1 0 0,0 1 0,1-1 0,0 1 0,0 0 0,0 0 0,0 0 0,0 0 0,1 0 0,-1 1 0,1 0 0,0-1 0,0 1 0,0 0 0,0 1 0,2-2-34,8-1 40,-1 0 1,1 1-1,0 0 0,0 1 1,0 1-1,0 0 1,1 1-1,1 0-40,36 4 460,33 7-460,-18-2 198,-50-7-171,477 50 480,-276-38-209,63-9-298,-68-18 152,-1-10 0,6-10-152,-125 19 37,191-36 29,15-17-66,276-84 66,-198 49-48,-184 56-24,35 2 6,-110 27 14,0 6-1,73 2-13,-159 9 20,0 1 0,0 2-1,0 1 1,0 2 0,-1 1 0,31 11-20,-48-13 15,1 1-1,-1 0 1,0 2 0,-1 0 0,0 0 0,0 1 0,-1 0-1,0 1 1,0 1 0,-1 0 0,-1 0 0,0 1 0,0 1-1,-1 0 1,1 3-15,7 16 30,-2 1 0,-1 0 0,-2 1 0,-1 1 0,-2 0 0,-1 0 0,0 10-30,7 78 272,-2 60-272,-9-109 51,5 62 55,19 536 556,-33-449-413,-10-1 0,-13 23-249,4-96-706,-6-1 0,-7-1-1,-33 77 707,57-190-2338,-1 0 0,-1-1 0,-2 0 0,-1-1 0,-17 21 2338,-28 34-1152</inkml:trace>
   <inkml:trace contextRef="#ctx0" brushRef="#br0" timeOffset="158814.676">17720 10244 15616,'29'5'0,"14"4"0,30 3 128,28 3-128,57-7 128,44-1 0,36-27 0,37-17-128,22-7 128,31-6-128,47-22 128,43-18-128,-14 2 127,1-9-127,1 28 0,-2 23-5887,-46 17 127,-1-1 3968</inkml:trace>
@@ -3951,6 +3952,399 @@
 </p:sld>
 </file>
 
+<file path=ppt/slides/slide2.xml><?xml version="1.0" encoding="utf-8"?>
+<p:sld xmlns:a="http://schemas.openxmlformats.org/drawingml/2006/main" xmlns:r="http://schemas.openxmlformats.org/officeDocument/2006/relationships" xmlns:p="http://schemas.openxmlformats.org/presentationml/2006/main">
+  <p:cSld>
+    <p:spTree>
+      <p:nvGrpSpPr>
+        <p:cNvPr id="1" name=""/>
+        <p:cNvGrpSpPr/>
+        <p:nvPr/>
+      </p:nvGrpSpPr>
+      <p:grpSpPr>
+        <a:xfrm>
+          <a:off x="0" y="0"/>
+          <a:ext cx="0" cy="0"/>
+          <a:chOff x="0" y="0"/>
+          <a:chExt cx="0" cy="0"/>
+        </a:xfrm>
+      </p:grpSpPr>
+      <p:sp>
+        <p:nvSpPr>
+          <p:cNvPr id="4" name="직사각형 3">
+            <a:extLst>
+              <a:ext uri="{FF2B5EF4-FFF2-40B4-BE49-F238E27FC236}">
+                <a16:creationId xmlns:a16="http://schemas.microsoft.com/office/drawing/2014/main" id="{244DC3B0-C94A-4998-8225-3056A449927C}"/>
+              </a:ext>
+            </a:extLst>
+          </p:cNvPr>
+          <p:cNvSpPr/>
+          <p:nvPr/>
+        </p:nvSpPr>
+        <p:spPr>
+          <a:xfrm>
+            <a:off x="1878676" y="1662544"/>
+            <a:ext cx="5519651" cy="2452255"/>
+          </a:xfrm>
+          <a:prstGeom prst="rect">
+            <a:avLst/>
+          </a:prstGeom>
+        </p:spPr>
+        <p:style>
+          <a:lnRef idx="2">
+            <a:schemeClr val="accent1">
+              <a:shade val="50000"/>
+            </a:schemeClr>
+          </a:lnRef>
+          <a:fillRef idx="1">
+            <a:schemeClr val="accent1"/>
+          </a:fillRef>
+          <a:effectRef idx="0">
+            <a:schemeClr val="accent1"/>
+          </a:effectRef>
+          <a:fontRef idx="minor">
+            <a:schemeClr val="lt1"/>
+          </a:fontRef>
+        </p:style>
+        <p:txBody>
+          <a:bodyPr rtlCol="0" anchor="ctr"/>
+          <a:lstStyle/>
+          <a:p>
+            <a:pPr algn="ctr"/>
+            <a:endParaRPr lang="ko-KR" altLang="en-US" dirty="0"/>
+          </a:p>
+        </p:txBody>
+      </p:sp>
+      <p:sp>
+        <p:nvSpPr>
+          <p:cNvPr id="5" name="직사각형 4">
+            <a:extLst>
+              <a:ext uri="{FF2B5EF4-FFF2-40B4-BE49-F238E27FC236}">
+                <a16:creationId xmlns:a16="http://schemas.microsoft.com/office/drawing/2014/main" id="{24CCC01C-2742-481E-B238-20A7BA148C9F}"/>
+              </a:ext>
+            </a:extLst>
+          </p:cNvPr>
+          <p:cNvSpPr/>
+          <p:nvPr/>
+        </p:nvSpPr>
+        <p:spPr>
+          <a:xfrm>
+            <a:off x="2069869" y="1941019"/>
+            <a:ext cx="3330629" cy="556953"/>
+          </a:xfrm>
+          <a:prstGeom prst="rect">
+            <a:avLst/>
+          </a:prstGeom>
+          <a:solidFill>
+            <a:schemeClr val="accent2"/>
+          </a:solidFill>
+        </p:spPr>
+        <p:style>
+          <a:lnRef idx="2">
+            <a:schemeClr val="accent1">
+              <a:shade val="50000"/>
+            </a:schemeClr>
+          </a:lnRef>
+          <a:fillRef idx="1">
+            <a:schemeClr val="accent1"/>
+          </a:fillRef>
+          <a:effectRef idx="0">
+            <a:schemeClr val="accent1"/>
+          </a:effectRef>
+          <a:fontRef idx="minor">
+            <a:schemeClr val="lt1"/>
+          </a:fontRef>
+        </p:style>
+        <p:txBody>
+          <a:bodyPr rtlCol="0" anchor="ctr"/>
+          <a:lstStyle/>
+          <a:p>
+            <a:pPr algn="ctr"/>
+            <a:r>
+              <a:rPr lang="ko-KR" altLang="en-US"/>
+              <a:t>이름</a:t>
+            </a:r>
+          </a:p>
+        </p:txBody>
+      </p:sp>
+      <p:sp>
+        <p:nvSpPr>
+          <p:cNvPr id="6" name="직사각형 5">
+            <a:extLst>
+              <a:ext uri="{FF2B5EF4-FFF2-40B4-BE49-F238E27FC236}">
+                <a16:creationId xmlns:a16="http://schemas.microsoft.com/office/drawing/2014/main" id="{9AF43B79-4BD9-4DEB-8092-FA45F7086090}"/>
+              </a:ext>
+            </a:extLst>
+          </p:cNvPr>
+          <p:cNvSpPr/>
+          <p:nvPr/>
+        </p:nvSpPr>
+        <p:spPr>
+          <a:xfrm>
+            <a:off x="2069869" y="2776446"/>
+            <a:ext cx="5120640" cy="1105597"/>
+          </a:xfrm>
+          <a:prstGeom prst="rect">
+            <a:avLst/>
+          </a:prstGeom>
+          <a:solidFill>
+            <a:schemeClr val="accent2"/>
+          </a:solidFill>
+        </p:spPr>
+        <p:style>
+          <a:lnRef idx="2">
+            <a:schemeClr val="accent1">
+              <a:shade val="50000"/>
+            </a:schemeClr>
+          </a:lnRef>
+          <a:fillRef idx="1">
+            <a:schemeClr val="accent1"/>
+          </a:fillRef>
+          <a:effectRef idx="0">
+            <a:schemeClr val="accent1"/>
+          </a:effectRef>
+          <a:fontRef idx="minor">
+            <a:schemeClr val="lt1"/>
+          </a:fontRef>
+        </p:style>
+        <p:txBody>
+          <a:bodyPr rtlCol="0" anchor="ctr"/>
+          <a:lstStyle/>
+          <a:p>
+            <a:pPr algn="ctr"/>
+            <a:r>
+              <a:rPr lang="ko-KR" altLang="en-US" dirty="0"/>
+              <a:t>키워드</a:t>
+            </a:r>
+          </a:p>
+        </p:txBody>
+      </p:sp>
+      <p:sp>
+        <p:nvSpPr>
+          <p:cNvPr id="7" name="직사각형 6">
+            <a:extLst>
+              <a:ext uri="{FF2B5EF4-FFF2-40B4-BE49-F238E27FC236}">
+                <a16:creationId xmlns:a16="http://schemas.microsoft.com/office/drawing/2014/main" id="{E024B324-5A38-452F-A62E-0E7FEEDBC28B}"/>
+              </a:ext>
+            </a:extLst>
+          </p:cNvPr>
+          <p:cNvSpPr/>
+          <p:nvPr/>
+        </p:nvSpPr>
+        <p:spPr>
+          <a:xfrm>
+            <a:off x="5634642" y="1805937"/>
+            <a:ext cx="1555865" cy="332511"/>
+          </a:xfrm>
+          <a:prstGeom prst="rect">
+            <a:avLst/>
+          </a:prstGeom>
+          <a:solidFill>
+            <a:schemeClr val="accent2"/>
+          </a:solidFill>
+        </p:spPr>
+        <p:style>
+          <a:lnRef idx="2">
+            <a:schemeClr val="accent1">
+              <a:shade val="50000"/>
+            </a:schemeClr>
+          </a:lnRef>
+          <a:fillRef idx="1">
+            <a:schemeClr val="accent1"/>
+          </a:fillRef>
+          <a:effectRef idx="0">
+            <a:schemeClr val="accent1"/>
+          </a:effectRef>
+          <a:fontRef idx="minor">
+            <a:schemeClr val="lt1"/>
+          </a:fontRef>
+        </p:style>
+        <p:txBody>
+          <a:bodyPr rtlCol="0" anchor="ctr"/>
+          <a:lstStyle/>
+          <a:p>
+            <a:pPr algn="ctr"/>
+            <a:r>
+              <a:rPr lang="ko-KR" altLang="en-US" dirty="0"/>
+              <a:t>날짜</a:t>
+            </a:r>
+          </a:p>
+        </p:txBody>
+      </p:sp>
+      <p:sp>
+        <p:nvSpPr>
+          <p:cNvPr id="8" name="직사각형 7">
+            <a:extLst>
+              <a:ext uri="{FF2B5EF4-FFF2-40B4-BE49-F238E27FC236}">
+                <a16:creationId xmlns:a16="http://schemas.microsoft.com/office/drawing/2014/main" id="{E40AC3F2-7BDE-4D6F-AEFF-3B1007A7732B}"/>
+              </a:ext>
+            </a:extLst>
+          </p:cNvPr>
+          <p:cNvSpPr/>
+          <p:nvPr/>
+        </p:nvSpPr>
+        <p:spPr>
+          <a:xfrm>
+            <a:off x="5634643" y="2281841"/>
+            <a:ext cx="1555866" cy="315885"/>
+          </a:xfrm>
+          <a:prstGeom prst="rect">
+            <a:avLst/>
+          </a:prstGeom>
+          <a:solidFill>
+            <a:schemeClr val="accent2"/>
+          </a:solidFill>
+        </p:spPr>
+        <p:style>
+          <a:lnRef idx="2">
+            <a:schemeClr val="accent1">
+              <a:shade val="50000"/>
+            </a:schemeClr>
+          </a:lnRef>
+          <a:fillRef idx="1">
+            <a:schemeClr val="accent1"/>
+          </a:fillRef>
+          <a:effectRef idx="0">
+            <a:schemeClr val="accent1"/>
+          </a:effectRef>
+          <a:fontRef idx="minor">
+            <a:schemeClr val="lt1"/>
+          </a:fontRef>
+        </p:style>
+        <p:txBody>
+          <a:bodyPr rtlCol="0" anchor="ctr"/>
+          <a:lstStyle/>
+          <a:p>
+            <a:pPr algn="ctr"/>
+            <a:r>
+              <a:rPr lang="ko-KR" altLang="en-US" dirty="0" err="1"/>
+              <a:t>술종류</a:t>
+            </a:r>
+            <a:endParaRPr lang="ko-KR" altLang="en-US" dirty="0"/>
+          </a:p>
+        </p:txBody>
+      </p:sp>
+      <p:cxnSp>
+        <p:nvCxnSpPr>
+          <p:cNvPr id="10" name="직선 연결선 9">
+            <a:extLst>
+              <a:ext uri="{FF2B5EF4-FFF2-40B4-BE49-F238E27FC236}">
+                <a16:creationId xmlns:a16="http://schemas.microsoft.com/office/drawing/2014/main" id="{E8505ED2-C5A1-48D3-A483-B7CEAE79C531}"/>
+              </a:ext>
+            </a:extLst>
+          </p:cNvPr>
+          <p:cNvCxnSpPr/>
+          <p:nvPr/>
+        </p:nvCxnSpPr>
+        <p:spPr>
+          <a:xfrm>
+            <a:off x="1429789" y="2701636"/>
+            <a:ext cx="6907876" cy="0"/>
+          </a:xfrm>
+          <a:prstGeom prst="line">
+            <a:avLst/>
+          </a:prstGeom>
+        </p:spPr>
+        <p:style>
+          <a:lnRef idx="1">
+            <a:schemeClr val="dk1"/>
+          </a:lnRef>
+          <a:fillRef idx="0">
+            <a:schemeClr val="dk1"/>
+          </a:fillRef>
+          <a:effectRef idx="0">
+            <a:schemeClr val="dk1"/>
+          </a:effectRef>
+          <a:fontRef idx="minor">
+            <a:schemeClr val="tx1"/>
+          </a:fontRef>
+        </p:style>
+      </p:cxnSp>
+      <p:cxnSp>
+        <p:nvCxnSpPr>
+          <p:cNvPr id="12" name="직선 연결선 11">
+            <a:extLst>
+              <a:ext uri="{FF2B5EF4-FFF2-40B4-BE49-F238E27FC236}">
+                <a16:creationId xmlns:a16="http://schemas.microsoft.com/office/drawing/2014/main" id="{02E45659-ABA8-43E3-93FF-F15FA6FDC734}"/>
+              </a:ext>
+            </a:extLst>
+          </p:cNvPr>
+          <p:cNvCxnSpPr/>
+          <p:nvPr/>
+        </p:nvCxnSpPr>
+        <p:spPr>
+          <a:xfrm flipV="1">
+            <a:off x="5519651" y="889462"/>
+            <a:ext cx="0" cy="1812174"/>
+          </a:xfrm>
+          <a:prstGeom prst="line">
+            <a:avLst/>
+          </a:prstGeom>
+        </p:spPr>
+        <p:style>
+          <a:lnRef idx="1">
+            <a:schemeClr val="dk1"/>
+          </a:lnRef>
+          <a:fillRef idx="0">
+            <a:schemeClr val="dk1"/>
+          </a:fillRef>
+          <a:effectRef idx="0">
+            <a:schemeClr val="dk1"/>
+          </a:effectRef>
+          <a:fontRef idx="minor">
+            <a:schemeClr val="tx1"/>
+          </a:fontRef>
+        </p:style>
+      </p:cxnSp>
+      <p:cxnSp>
+        <p:nvCxnSpPr>
+          <p:cNvPr id="14" name="직선 연결선 13">
+            <a:extLst>
+              <a:ext uri="{FF2B5EF4-FFF2-40B4-BE49-F238E27FC236}">
+                <a16:creationId xmlns:a16="http://schemas.microsoft.com/office/drawing/2014/main" id="{9996F5D7-4EFF-4255-B658-67427FDCD28B}"/>
+              </a:ext>
+            </a:extLst>
+          </p:cNvPr>
+          <p:cNvCxnSpPr/>
+          <p:nvPr/>
+        </p:nvCxnSpPr>
+        <p:spPr>
+          <a:xfrm>
+            <a:off x="5519651" y="2213262"/>
+            <a:ext cx="2660073" cy="0"/>
+          </a:xfrm>
+          <a:prstGeom prst="line">
+            <a:avLst/>
+          </a:prstGeom>
+        </p:spPr>
+        <p:style>
+          <a:lnRef idx="1">
+            <a:schemeClr val="dk1"/>
+          </a:lnRef>
+          <a:fillRef idx="0">
+            <a:schemeClr val="dk1"/>
+          </a:fillRef>
+          <a:effectRef idx="0">
+            <a:schemeClr val="dk1"/>
+          </a:effectRef>
+          <a:fontRef idx="minor">
+            <a:schemeClr val="tx1"/>
+          </a:fontRef>
+        </p:style>
+      </p:cxnSp>
+    </p:spTree>
+    <p:extLst>
+      <p:ext uri="{BB962C8B-B14F-4D97-AF65-F5344CB8AC3E}">
+        <p14:creationId xmlns:p14="http://schemas.microsoft.com/office/powerpoint/2010/main" val="2048185715"/>
+      </p:ext>
+    </p:extLst>
+  </p:cSld>
+  <p:clrMapOvr>
+    <a:masterClrMapping/>
+  </p:clrMapOvr>
+</p:sld>
+</file>
+
 <file path=ppt/theme/theme1.xml><?xml version="1.0" encoding="utf-8"?>
 <a:theme xmlns:a="http://schemas.openxmlformats.org/drawingml/2006/main" name="Office 테마">
   <a:themeElements>

</xml_diff>

<commit_message>
add docs, apk build
</commit_message>
<xml_diff>
--- a/Documents/Layout.pptx
+++ b/Documents/Layout.pptx
@@ -7,6 +7,7 @@
   <p:sldIdLst>
     <p:sldId id="256" r:id="rId2"/>
     <p:sldId id="257" r:id="rId3"/>
+    <p:sldId id="258" r:id="rId4"/>
   </p:sldIdLst>
   <p:sldSz cx="12192000" cy="6858000"/>
   <p:notesSz cx="6858000" cy="9144000"/>
@@ -177,7 +178,7 @@
   <inkml:trace contextRef="#ctx0" brushRef="#br0" timeOffset="110058.157">9757 2785 17535,'0'0'128,"0"0"0,0 0 0,93-10 0,-33 2 0,5-2 0,4 3 0,1-3-256,1 1 128,-2-1-2175,-18 5-1,1 0-7296</inkml:trace>
   <inkml:trace contextRef="#ctx0" brushRef="#br0" timeOffset="110306.491">9844 2454 15104,'0'0'256,"-9"-3"128,-4-7-128,5 8 0,3 2 127,10 25 129,10 15-256,8 10 0,10 12-128,1 3 128,1 9-256,3-2 0,2 3-4991,2-15-1,-2 3 640</inkml:trace>
   <inkml:trace contextRef="#ctx0" brushRef="#br0" timeOffset="145601.8">18591 3576 9728,'25'41'384,"-25"-41"-378,0 0 0,0 0 0,0 0 1,0 0-1,0 0 0,0 1 0,0-1 1,0 0-1,0 0 0,0 0 0,0 0 1,0 0-1,0 0 0,1 1 0,-1-1 1,0 0-1,0 0 0,0 0 0,0 0 0,0 0 1,0 0-1,0 0 0,1 0 0,-1 0 1,0 0-1,0 1 0,0-1 0,0 0 1,0 0-1,1 0 0,-1 0 0,0 0 1,0 0-1,0 0 0,0 0 0,0 0 1,1 0-1,-1 0 0,0 0 0,0 0 0,0 0 1,0 0-1,0 0 0,1-1 0,-1 1 1,0 0-1,0 0 0,0 0 0,0 0 1,0 0-1,0 0 0,1 0 0,-1 0 1,0 0-1,0-1 0,0 1 0,0 0 1,0 0-1,0 0 0,0 0 0,0 0 0,0 0 1,0-1-1,0 1-6,2-10 100,-1 9 190,8 65 126,-3 1-1,-2 0 1,-4 0 0,-2 1-416,1 36 342,2-57-411,4-16-3744,-1-18-1883</inkml:trace>
-  <inkml:trace contextRef="#ctx0" brushRef="#br0" timeOffset="145998.883">18754 3693 10112,'71'-8'460,"-1"-2"1,0-4-1,31-12-460,48-10 1008,-116 29-834,0 2 0,1 1 1,0 2-1,-1 1 0,1 1 0,0 2 0,0 2 1,-1 1-1,0 2 0,0 0 0,0 3 1,16 7-175,-43-14 69,0 0 0,0 1 0,0 0 0,0 0 1,-1 1-1,0 0 0,0-1 0,0 2 0,0-1 1,-1 0-1,0 1 0,0 0 0,0 0 0,-1 0 1,0 1-1,0-1 0,0 1 0,1 6-69,3 15 100,0 0 1,-2 0-1,-2 1 0,0 0-100,-2-19 39,3 58 153,-4 0 0,-2 0 0,-9 55-192,3-90-3371,3-19-5631</inkml:trace>
+  <inkml:trace contextRef="#ctx0" brushRef="#br0" timeOffset="145998.881">18754 3693 10112,'71'-8'460,"-1"-2"1,0-4-1,31-12-460,48-10 1008,-116 29-834,0 2 0,1 1 1,0 2-1,-1 1 0,1 1 0,0 2 0,0 2 1,-1 1-1,0 2 0,0 0 0,0 3 1,16 7-175,-43-14 69,0 0 0,0 1 0,0 0 0,0 0 1,-1 1-1,0 0 0,0-1 0,0 2 0,0-1 1,-1 0-1,0 1 0,0 0 0,0 0 0,-1 0 1,0 1-1,0-1 0,0 1 0,1 6-69,3 15 100,0 0 1,-2 0-1,-2 1 0,0 0-100,-2-19 39,3 58 153,-4 0 0,-2 0 0,-9 55-192,3-90-3371,3-19-5631</inkml:trace>
   <inkml:trace contextRef="#ctx0" brushRef="#br0" timeOffset="146233.258">18667 4335 12544,'0'0'0,"0"0"128,0 0 0,0 0 0,17-2 128,13-6 256,22 1 128,16-3-384,7-5 0,10-9-128,13 8 128,9-8-256,-4 8 0,1-4-11008</inkml:trace>
   <inkml:trace contextRef="#ctx0" brushRef="#br0" timeOffset="146982.827">20391 3942 13824,'0'0'0,"0"0"0,0 0 0,56-20 0,-26 12 128,-3 1-128,3-1 128,-2 3-128,-4 0 128,-4-2-128,-7 2 128,-1 2-128,-4 1 0,-6-3-2176,-4-3 0,-1 1-4352</inkml:trace>
   <inkml:trace contextRef="#ctx0" brushRef="#br0" timeOffset="147154.719">20489 3723 12800,'10'14'0,"10"2"128,-12-6 128,-3-1 256,0 1 128,-1 0-256,1 15 0,0 2-128,1 6 0,1 2-128,-4 2 128,1 3-256,-4-7 0,-4-6-1152,4-9 0,0-1-8448</inkml:trace>
@@ -343,7 +344,7 @@
           <a:p>
             <a:fld id="{FD187567-F450-4F7C-8811-F547CDEC17E2}" type="datetimeFigureOut">
               <a:rPr lang="ko-KR" altLang="en-US" smtClean="0"/>
-              <a:t>2018-11-30</a:t>
+              <a:t>2018-12-06</a:t>
             </a:fld>
             <a:endParaRPr lang="ko-KR" altLang="en-US"/>
           </a:p>
@@ -541,7 +542,7 @@
           <a:p>
             <a:fld id="{FD187567-F450-4F7C-8811-F547CDEC17E2}" type="datetimeFigureOut">
               <a:rPr lang="ko-KR" altLang="en-US" smtClean="0"/>
-              <a:t>2018-11-30</a:t>
+              <a:t>2018-12-06</a:t>
             </a:fld>
             <a:endParaRPr lang="ko-KR" altLang="en-US"/>
           </a:p>
@@ -749,7 +750,7 @@
           <a:p>
             <a:fld id="{FD187567-F450-4F7C-8811-F547CDEC17E2}" type="datetimeFigureOut">
               <a:rPr lang="ko-KR" altLang="en-US" smtClean="0"/>
-              <a:t>2018-11-30</a:t>
+              <a:t>2018-12-06</a:t>
             </a:fld>
             <a:endParaRPr lang="ko-KR" altLang="en-US"/>
           </a:p>
@@ -947,7 +948,7 @@
           <a:p>
             <a:fld id="{FD187567-F450-4F7C-8811-F547CDEC17E2}" type="datetimeFigureOut">
               <a:rPr lang="ko-KR" altLang="en-US" smtClean="0"/>
-              <a:t>2018-11-30</a:t>
+              <a:t>2018-12-06</a:t>
             </a:fld>
             <a:endParaRPr lang="ko-KR" altLang="en-US"/>
           </a:p>
@@ -1222,7 +1223,7 @@
           <a:p>
             <a:fld id="{FD187567-F450-4F7C-8811-F547CDEC17E2}" type="datetimeFigureOut">
               <a:rPr lang="ko-KR" altLang="en-US" smtClean="0"/>
-              <a:t>2018-11-30</a:t>
+              <a:t>2018-12-06</a:t>
             </a:fld>
             <a:endParaRPr lang="ko-KR" altLang="en-US"/>
           </a:p>
@@ -1487,7 +1488,7 @@
           <a:p>
             <a:fld id="{FD187567-F450-4F7C-8811-F547CDEC17E2}" type="datetimeFigureOut">
               <a:rPr lang="ko-KR" altLang="en-US" smtClean="0"/>
-              <a:t>2018-11-30</a:t>
+              <a:t>2018-12-06</a:t>
             </a:fld>
             <a:endParaRPr lang="ko-KR" altLang="en-US"/>
           </a:p>
@@ -1899,7 +1900,7 @@
           <a:p>
             <a:fld id="{FD187567-F450-4F7C-8811-F547CDEC17E2}" type="datetimeFigureOut">
               <a:rPr lang="ko-KR" altLang="en-US" smtClean="0"/>
-              <a:t>2018-11-30</a:t>
+              <a:t>2018-12-06</a:t>
             </a:fld>
             <a:endParaRPr lang="ko-KR" altLang="en-US"/>
           </a:p>
@@ -2040,7 +2041,7 @@
           <a:p>
             <a:fld id="{FD187567-F450-4F7C-8811-F547CDEC17E2}" type="datetimeFigureOut">
               <a:rPr lang="ko-KR" altLang="en-US" smtClean="0"/>
-              <a:t>2018-11-30</a:t>
+              <a:t>2018-12-06</a:t>
             </a:fld>
             <a:endParaRPr lang="ko-KR" altLang="en-US"/>
           </a:p>
@@ -2153,7 +2154,7 @@
           <a:p>
             <a:fld id="{FD187567-F450-4F7C-8811-F547CDEC17E2}" type="datetimeFigureOut">
               <a:rPr lang="ko-KR" altLang="en-US" smtClean="0"/>
-              <a:t>2018-11-30</a:t>
+              <a:t>2018-12-06</a:t>
             </a:fld>
             <a:endParaRPr lang="ko-KR" altLang="en-US"/>
           </a:p>
@@ -2464,7 +2465,7 @@
           <a:p>
             <a:fld id="{FD187567-F450-4F7C-8811-F547CDEC17E2}" type="datetimeFigureOut">
               <a:rPr lang="ko-KR" altLang="en-US" smtClean="0"/>
-              <a:t>2018-11-30</a:t>
+              <a:t>2018-12-06</a:t>
             </a:fld>
             <a:endParaRPr lang="ko-KR" altLang="en-US"/>
           </a:p>
@@ -2752,7 +2753,7 @@
           <a:p>
             <a:fld id="{FD187567-F450-4F7C-8811-F547CDEC17E2}" type="datetimeFigureOut">
               <a:rPr lang="ko-KR" altLang="en-US" smtClean="0"/>
-              <a:t>2018-11-30</a:t>
+              <a:t>2018-12-06</a:t>
             </a:fld>
             <a:endParaRPr lang="ko-KR" altLang="en-US"/>
           </a:p>
@@ -2993,7 +2994,7 @@
           <a:p>
             <a:fld id="{FD187567-F450-4F7C-8811-F547CDEC17E2}" type="datetimeFigureOut">
               <a:rPr lang="ko-KR" altLang="en-US" smtClean="0"/>
-              <a:t>2018-11-30</a:t>
+              <a:t>2018-12-06</a:t>
             </a:fld>
             <a:endParaRPr lang="ko-KR" altLang="en-US"/>
           </a:p>
@@ -4345,6 +4346,749 @@
 </p:sld>
 </file>
 
+<file path=ppt/slides/slide3.xml><?xml version="1.0" encoding="utf-8"?>
+<p:sld xmlns:a="http://schemas.openxmlformats.org/drawingml/2006/main" xmlns:r="http://schemas.openxmlformats.org/officeDocument/2006/relationships" xmlns:p="http://schemas.openxmlformats.org/presentationml/2006/main">
+  <p:cSld>
+    <p:spTree>
+      <p:nvGrpSpPr>
+        <p:cNvPr id="1" name=""/>
+        <p:cNvGrpSpPr/>
+        <p:nvPr/>
+      </p:nvGrpSpPr>
+      <p:grpSpPr>
+        <a:xfrm>
+          <a:off x="0" y="0"/>
+          <a:ext cx="0" cy="0"/>
+          <a:chOff x="0" y="0"/>
+          <a:chExt cx="0" cy="0"/>
+        </a:xfrm>
+      </p:grpSpPr>
+      <p:grpSp>
+        <p:nvGrpSpPr>
+          <p:cNvPr id="14" name="그룹 13">
+            <a:extLst>
+              <a:ext uri="{FF2B5EF4-FFF2-40B4-BE49-F238E27FC236}">
+                <a16:creationId xmlns:a16="http://schemas.microsoft.com/office/drawing/2014/main" id="{16837662-2CB7-4B48-A4AE-73D216D9BCA2}"/>
+              </a:ext>
+            </a:extLst>
+          </p:cNvPr>
+          <p:cNvGrpSpPr/>
+          <p:nvPr/>
+        </p:nvGrpSpPr>
+        <p:grpSpPr>
+          <a:xfrm>
+            <a:off x="4246789" y="473527"/>
+            <a:ext cx="3698421" cy="5690507"/>
+            <a:chOff x="2988129" y="449035"/>
+            <a:chExt cx="4686300" cy="5690507"/>
+          </a:xfrm>
+        </p:grpSpPr>
+        <p:sp>
+          <p:nvSpPr>
+            <p:cNvPr id="4" name="직사각형 3">
+              <a:extLst>
+                <a:ext uri="{FF2B5EF4-FFF2-40B4-BE49-F238E27FC236}">
+                  <a16:creationId xmlns:a16="http://schemas.microsoft.com/office/drawing/2014/main" id="{711A1135-E81C-458E-BF70-501825526E52}"/>
+                </a:ext>
+              </a:extLst>
+            </p:cNvPr>
+            <p:cNvSpPr/>
+            <p:nvPr/>
+          </p:nvSpPr>
+          <p:spPr>
+            <a:xfrm>
+              <a:off x="2988129" y="449035"/>
+              <a:ext cx="4686300" cy="5690507"/>
+            </a:xfrm>
+            <a:prstGeom prst="rect">
+              <a:avLst/>
+            </a:prstGeom>
+          </p:spPr>
+          <p:style>
+            <a:lnRef idx="2">
+              <a:schemeClr val="accent6"/>
+            </a:lnRef>
+            <a:fillRef idx="1">
+              <a:schemeClr val="lt1"/>
+            </a:fillRef>
+            <a:effectRef idx="0">
+              <a:schemeClr val="accent6"/>
+            </a:effectRef>
+            <a:fontRef idx="minor">
+              <a:schemeClr val="dk1"/>
+            </a:fontRef>
+          </p:style>
+          <p:txBody>
+            <a:bodyPr rtlCol="0" anchor="ctr"/>
+            <a:lstStyle/>
+            <a:p>
+              <a:pPr algn="ctr"/>
+              <a:endParaRPr lang="ko-KR" altLang="en-US"/>
+            </a:p>
+          </p:txBody>
+        </p:sp>
+        <p:sp>
+          <p:nvSpPr>
+            <p:cNvPr id="5" name="직사각형 4">
+              <a:extLst>
+                <a:ext uri="{FF2B5EF4-FFF2-40B4-BE49-F238E27FC236}">
+                  <a16:creationId xmlns:a16="http://schemas.microsoft.com/office/drawing/2014/main" id="{C9FDADE5-ED2E-4FCD-B9CF-55ABD2FC0B8F}"/>
+                </a:ext>
+              </a:extLst>
+            </p:cNvPr>
+            <p:cNvSpPr/>
+            <p:nvPr/>
+          </p:nvSpPr>
+          <p:spPr>
+            <a:xfrm>
+              <a:off x="2988129" y="449035"/>
+              <a:ext cx="4686300" cy="579665"/>
+            </a:xfrm>
+            <a:prstGeom prst="rect">
+              <a:avLst/>
+            </a:prstGeom>
+          </p:spPr>
+          <p:style>
+            <a:lnRef idx="2">
+              <a:schemeClr val="accent1">
+                <a:shade val="50000"/>
+              </a:schemeClr>
+            </a:lnRef>
+            <a:fillRef idx="1">
+              <a:schemeClr val="accent1"/>
+            </a:fillRef>
+            <a:effectRef idx="0">
+              <a:schemeClr val="accent1"/>
+            </a:effectRef>
+            <a:fontRef idx="minor">
+              <a:schemeClr val="lt1"/>
+            </a:fontRef>
+          </p:style>
+          <p:txBody>
+            <a:bodyPr rtlCol="0" anchor="ctr"/>
+            <a:lstStyle/>
+            <a:p>
+              <a:pPr algn="ctr"/>
+              <a:endParaRPr lang="ko-KR" altLang="en-US"/>
+            </a:p>
+          </p:txBody>
+        </p:sp>
+        <p:sp>
+          <p:nvSpPr>
+            <p:cNvPr id="6" name="직사각형 5">
+              <a:extLst>
+                <a:ext uri="{FF2B5EF4-FFF2-40B4-BE49-F238E27FC236}">
+                  <a16:creationId xmlns:a16="http://schemas.microsoft.com/office/drawing/2014/main" id="{BE4A72AD-BF1E-4FB2-8F81-AEF388912883}"/>
+                </a:ext>
+              </a:extLst>
+            </p:cNvPr>
+            <p:cNvSpPr/>
+            <p:nvPr/>
+          </p:nvSpPr>
+          <p:spPr>
+            <a:xfrm>
+              <a:off x="3927022" y="526596"/>
+              <a:ext cx="2808514" cy="424542"/>
+            </a:xfrm>
+            <a:prstGeom prst="rect">
+              <a:avLst/>
+            </a:prstGeom>
+            <a:solidFill>
+              <a:schemeClr val="accent2"/>
+            </a:solidFill>
+          </p:spPr>
+          <p:style>
+            <a:lnRef idx="2">
+              <a:schemeClr val="accent1">
+                <a:shade val="50000"/>
+              </a:schemeClr>
+            </a:lnRef>
+            <a:fillRef idx="1">
+              <a:schemeClr val="accent1"/>
+            </a:fillRef>
+            <a:effectRef idx="0">
+              <a:schemeClr val="accent1"/>
+            </a:effectRef>
+            <a:fontRef idx="minor">
+              <a:schemeClr val="lt1"/>
+            </a:fontRef>
+          </p:style>
+          <p:txBody>
+            <a:bodyPr rtlCol="0" anchor="ctr"/>
+            <a:lstStyle/>
+            <a:p>
+              <a:pPr algn="ctr"/>
+              <a:r>
+                <a:rPr lang="ko-KR" altLang="en-US" dirty="0" err="1"/>
+                <a:t>술이름</a:t>
+              </a:r>
+              <a:r>
+                <a:rPr lang="ko-KR" altLang="en-US" dirty="0"/>
+                <a:t> </a:t>
+              </a:r>
+              <a:r>
+                <a:rPr lang="en-US" altLang="ko-KR" dirty="0"/>
+                <a:t>+ </a:t>
+              </a:r>
+              <a:r>
+                <a:rPr lang="ko-KR" altLang="en-US" dirty="0" err="1"/>
+                <a:t>먹은날짜</a:t>
+              </a:r>
+              <a:endParaRPr lang="ko-KR" altLang="en-US" dirty="0"/>
+            </a:p>
+          </p:txBody>
+        </p:sp>
+        <p:sp>
+          <p:nvSpPr>
+            <p:cNvPr id="7" name="직사각형 6">
+              <a:extLst>
+                <a:ext uri="{FF2B5EF4-FFF2-40B4-BE49-F238E27FC236}">
+                  <a16:creationId xmlns:a16="http://schemas.microsoft.com/office/drawing/2014/main" id="{165FA00B-703B-4178-952B-330C7D311784}"/>
+                </a:ext>
+              </a:extLst>
+            </p:cNvPr>
+            <p:cNvSpPr/>
+            <p:nvPr/>
+          </p:nvSpPr>
+          <p:spPr>
+            <a:xfrm>
+              <a:off x="3094263" y="1106260"/>
+              <a:ext cx="4471309" cy="510270"/>
+            </a:xfrm>
+            <a:prstGeom prst="rect">
+              <a:avLst/>
+            </a:prstGeom>
+            <a:solidFill>
+              <a:schemeClr val="accent2"/>
+            </a:solidFill>
+          </p:spPr>
+          <p:style>
+            <a:lnRef idx="2">
+              <a:schemeClr val="accent1">
+                <a:shade val="50000"/>
+              </a:schemeClr>
+            </a:lnRef>
+            <a:fillRef idx="1">
+              <a:schemeClr val="accent1"/>
+            </a:fillRef>
+            <a:effectRef idx="0">
+              <a:schemeClr val="accent1"/>
+            </a:effectRef>
+            <a:fontRef idx="minor">
+              <a:schemeClr val="lt1"/>
+            </a:fontRef>
+          </p:style>
+          <p:txBody>
+            <a:bodyPr rtlCol="0" anchor="ctr"/>
+            <a:lstStyle/>
+            <a:p>
+              <a:pPr algn="ctr"/>
+              <a:r>
+                <a:rPr lang="ko-KR" altLang="en-US" dirty="0" err="1"/>
+                <a:t>술이름</a:t>
+              </a:r>
+              <a:r>
+                <a:rPr lang="en-US" altLang="ko-KR" dirty="0"/>
+                <a:t>:</a:t>
+              </a:r>
+              <a:r>
+                <a:rPr lang="ko-KR" altLang="en-US" dirty="0"/>
+                <a:t> </a:t>
+              </a:r>
+              <a:r>
+                <a:rPr lang="en-US" altLang="ko-KR" dirty="0"/>
+                <a:t>@@@</a:t>
+              </a:r>
+              <a:endParaRPr lang="ko-KR" altLang="en-US" dirty="0"/>
+            </a:p>
+          </p:txBody>
+        </p:sp>
+        <p:sp>
+          <p:nvSpPr>
+            <p:cNvPr id="8" name="직사각형 7">
+              <a:extLst>
+                <a:ext uri="{FF2B5EF4-FFF2-40B4-BE49-F238E27FC236}">
+                  <a16:creationId xmlns:a16="http://schemas.microsoft.com/office/drawing/2014/main" id="{1E8B79ED-6CDF-4987-ADCE-D62E7DF201F3}"/>
+                </a:ext>
+              </a:extLst>
+            </p:cNvPr>
+            <p:cNvSpPr/>
+            <p:nvPr/>
+          </p:nvSpPr>
+          <p:spPr>
+            <a:xfrm>
+              <a:off x="6202134" y="1694090"/>
+              <a:ext cx="1363438" cy="206150"/>
+            </a:xfrm>
+            <a:prstGeom prst="rect">
+              <a:avLst/>
+            </a:prstGeom>
+            <a:solidFill>
+              <a:schemeClr val="accent2"/>
+            </a:solidFill>
+          </p:spPr>
+          <p:style>
+            <a:lnRef idx="2">
+              <a:schemeClr val="accent1">
+                <a:shade val="50000"/>
+              </a:schemeClr>
+            </a:lnRef>
+            <a:fillRef idx="1">
+              <a:schemeClr val="accent1"/>
+            </a:fillRef>
+            <a:effectRef idx="0">
+              <a:schemeClr val="accent1"/>
+            </a:effectRef>
+            <a:fontRef idx="minor">
+              <a:schemeClr val="lt1"/>
+            </a:fontRef>
+          </p:style>
+          <p:txBody>
+            <a:bodyPr rtlCol="0" anchor="ctr"/>
+            <a:lstStyle/>
+            <a:p>
+              <a:pPr algn="ctr"/>
+              <a:r>
+                <a:rPr lang="ko-KR" altLang="en-US"/>
+                <a:t>날짜</a:t>
+              </a:r>
+              <a:endParaRPr lang="ko-KR" altLang="en-US" dirty="0"/>
+            </a:p>
+          </p:txBody>
+        </p:sp>
+        <p:sp>
+          <p:nvSpPr>
+            <p:cNvPr id="9" name="직사각형 8">
+              <a:extLst>
+                <a:ext uri="{FF2B5EF4-FFF2-40B4-BE49-F238E27FC236}">
+                  <a16:creationId xmlns:a16="http://schemas.microsoft.com/office/drawing/2014/main" id="{E19CFECF-3948-4CF5-8AF3-9907DF733754}"/>
+                </a:ext>
+              </a:extLst>
+            </p:cNvPr>
+            <p:cNvSpPr/>
+            <p:nvPr/>
+          </p:nvSpPr>
+          <p:spPr>
+            <a:xfrm>
+              <a:off x="6202134" y="1988005"/>
+              <a:ext cx="1363438" cy="206150"/>
+            </a:xfrm>
+            <a:prstGeom prst="rect">
+              <a:avLst/>
+            </a:prstGeom>
+            <a:solidFill>
+              <a:schemeClr val="accent2"/>
+            </a:solidFill>
+          </p:spPr>
+          <p:style>
+            <a:lnRef idx="2">
+              <a:schemeClr val="accent1">
+                <a:shade val="50000"/>
+              </a:schemeClr>
+            </a:lnRef>
+            <a:fillRef idx="1">
+              <a:schemeClr val="accent1"/>
+            </a:fillRef>
+            <a:effectRef idx="0">
+              <a:schemeClr val="accent1"/>
+            </a:effectRef>
+            <a:fontRef idx="minor">
+              <a:schemeClr val="lt1"/>
+            </a:fontRef>
+          </p:style>
+          <p:txBody>
+            <a:bodyPr rtlCol="0" anchor="ctr"/>
+            <a:lstStyle/>
+            <a:p>
+              <a:pPr algn="ctr"/>
+              <a:r>
+                <a:rPr lang="ko-KR" altLang="en-US" dirty="0" err="1"/>
+                <a:t>술종류</a:t>
+              </a:r>
+              <a:endParaRPr lang="ko-KR" altLang="en-US" dirty="0"/>
+            </a:p>
+          </p:txBody>
+        </p:sp>
+        <p:sp>
+          <p:nvSpPr>
+            <p:cNvPr id="10" name="직사각형 9">
+              <a:extLst>
+                <a:ext uri="{FF2B5EF4-FFF2-40B4-BE49-F238E27FC236}">
+                  <a16:creationId xmlns:a16="http://schemas.microsoft.com/office/drawing/2014/main" id="{285906DE-06BD-49C0-8A8D-52DBA42DC174}"/>
+                </a:ext>
+              </a:extLst>
+            </p:cNvPr>
+            <p:cNvSpPr/>
+            <p:nvPr/>
+          </p:nvSpPr>
+          <p:spPr>
+            <a:xfrm>
+              <a:off x="3094263" y="2281920"/>
+              <a:ext cx="4471309" cy="3751487"/>
+            </a:xfrm>
+            <a:prstGeom prst="rect">
+              <a:avLst/>
+            </a:prstGeom>
+            <a:solidFill>
+              <a:schemeClr val="accent2"/>
+            </a:solidFill>
+          </p:spPr>
+          <p:style>
+            <a:lnRef idx="2">
+              <a:schemeClr val="accent1">
+                <a:shade val="50000"/>
+              </a:schemeClr>
+            </a:lnRef>
+            <a:fillRef idx="1">
+              <a:schemeClr val="accent1"/>
+            </a:fillRef>
+            <a:effectRef idx="0">
+              <a:schemeClr val="accent1"/>
+            </a:effectRef>
+            <a:fontRef idx="minor">
+              <a:schemeClr val="lt1"/>
+            </a:fontRef>
+          </p:style>
+          <p:txBody>
+            <a:bodyPr rtlCol="0" anchor="ctr"/>
+            <a:lstStyle/>
+            <a:p>
+              <a:pPr algn="ctr"/>
+              <a:r>
+                <a:rPr lang="ko-KR" altLang="en-US" dirty="0"/>
+                <a:t>맛있는 </a:t>
+              </a:r>
+              <a:r>
+                <a:rPr lang="ko-KR" altLang="en-US" dirty="0" err="1"/>
+                <a:t>술이였나요</a:t>
+              </a:r>
+              <a:r>
+                <a:rPr lang="en-US" altLang="ko-KR" dirty="0"/>
+                <a:t>? @@@@@@@@@@@@@@@@@@@@@@@@@@@@@@@@@@@@@@@@@@@@@@@@@@@@@@@@</a:t>
+              </a:r>
+              <a:endParaRPr lang="ko-KR" altLang="en-US" dirty="0"/>
+            </a:p>
+          </p:txBody>
+        </p:sp>
+        <p:sp>
+          <p:nvSpPr>
+            <p:cNvPr id="11" name="직사각형 10">
+              <a:extLst>
+                <a:ext uri="{FF2B5EF4-FFF2-40B4-BE49-F238E27FC236}">
+                  <a16:creationId xmlns:a16="http://schemas.microsoft.com/office/drawing/2014/main" id="{D0277191-9141-46A0-83BA-3A086FB2A7BB}"/>
+                </a:ext>
+              </a:extLst>
+            </p:cNvPr>
+            <p:cNvSpPr/>
+            <p:nvPr/>
+          </p:nvSpPr>
+          <p:spPr>
+            <a:xfrm>
+              <a:off x="3094262" y="1694090"/>
+              <a:ext cx="3001737" cy="510270"/>
+            </a:xfrm>
+            <a:prstGeom prst="rect">
+              <a:avLst/>
+            </a:prstGeom>
+            <a:solidFill>
+              <a:schemeClr val="accent2"/>
+            </a:solidFill>
+          </p:spPr>
+          <p:style>
+            <a:lnRef idx="2">
+              <a:schemeClr val="accent1">
+                <a:shade val="50000"/>
+              </a:schemeClr>
+            </a:lnRef>
+            <a:fillRef idx="1">
+              <a:schemeClr val="accent1"/>
+            </a:fillRef>
+            <a:effectRef idx="0">
+              <a:schemeClr val="accent1"/>
+            </a:effectRef>
+            <a:fontRef idx="minor">
+              <a:schemeClr val="lt1"/>
+            </a:fontRef>
+          </p:style>
+          <p:txBody>
+            <a:bodyPr rtlCol="0" anchor="ctr"/>
+            <a:lstStyle/>
+            <a:p>
+              <a:pPr algn="ctr"/>
+              <a:r>
+                <a:rPr lang="ko-KR" altLang="en-US" dirty="0" err="1"/>
+                <a:t>같이먹은</a:t>
+              </a:r>
+              <a:r>
+                <a:rPr lang="ko-KR" altLang="en-US" dirty="0"/>
+                <a:t> 안주</a:t>
+              </a:r>
+              <a:r>
+                <a:rPr lang="en-US" altLang="ko-KR" dirty="0"/>
+                <a:t>: @@@@</a:t>
+              </a:r>
+              <a:endParaRPr lang="ko-KR" altLang="en-US" dirty="0"/>
+            </a:p>
+          </p:txBody>
+        </p:sp>
+        <p:sp>
+          <p:nvSpPr>
+            <p:cNvPr id="12" name="직사각형 11">
+              <a:extLst>
+                <a:ext uri="{FF2B5EF4-FFF2-40B4-BE49-F238E27FC236}">
+                  <a16:creationId xmlns:a16="http://schemas.microsoft.com/office/drawing/2014/main" id="{6DC62DCC-F630-4F39-8113-DF14009433E2}"/>
+                </a:ext>
+              </a:extLst>
+            </p:cNvPr>
+            <p:cNvSpPr/>
+            <p:nvPr/>
+          </p:nvSpPr>
+          <p:spPr>
+            <a:xfrm>
+              <a:off x="7033038" y="526596"/>
+              <a:ext cx="532534" cy="424542"/>
+            </a:xfrm>
+            <a:prstGeom prst="rect">
+              <a:avLst/>
+            </a:prstGeom>
+            <a:solidFill>
+              <a:schemeClr val="bg2"/>
+            </a:solidFill>
+          </p:spPr>
+          <p:style>
+            <a:lnRef idx="2">
+              <a:schemeClr val="accent1">
+                <a:shade val="50000"/>
+              </a:schemeClr>
+            </a:lnRef>
+            <a:fillRef idx="1">
+              <a:schemeClr val="accent1"/>
+            </a:fillRef>
+            <a:effectRef idx="0">
+              <a:schemeClr val="accent1"/>
+            </a:effectRef>
+            <a:fontRef idx="minor">
+              <a:schemeClr val="lt1"/>
+            </a:fontRef>
+          </p:style>
+          <p:txBody>
+            <a:bodyPr rtlCol="0" anchor="ctr"/>
+            <a:lstStyle/>
+            <a:p>
+              <a:pPr algn="ctr"/>
+              <a:endParaRPr lang="ko-KR" altLang="en-US"/>
+            </a:p>
+          </p:txBody>
+        </p:sp>
+        <p:sp>
+          <p:nvSpPr>
+            <p:cNvPr id="13" name="직사각형 12">
+              <a:extLst>
+                <a:ext uri="{FF2B5EF4-FFF2-40B4-BE49-F238E27FC236}">
+                  <a16:creationId xmlns:a16="http://schemas.microsoft.com/office/drawing/2014/main" id="{A43B4830-E13D-4085-8709-BDCABF93454D}"/>
+                </a:ext>
+              </a:extLst>
+            </p:cNvPr>
+            <p:cNvSpPr/>
+            <p:nvPr/>
+          </p:nvSpPr>
+          <p:spPr>
+            <a:xfrm>
+              <a:off x="3094262" y="526596"/>
+              <a:ext cx="535258" cy="424542"/>
+            </a:xfrm>
+            <a:prstGeom prst="rect">
+              <a:avLst/>
+            </a:prstGeom>
+            <a:solidFill>
+              <a:schemeClr val="bg2"/>
+            </a:solidFill>
+          </p:spPr>
+          <p:style>
+            <a:lnRef idx="2">
+              <a:schemeClr val="accent1">
+                <a:shade val="50000"/>
+              </a:schemeClr>
+            </a:lnRef>
+            <a:fillRef idx="1">
+              <a:schemeClr val="accent1"/>
+            </a:fillRef>
+            <a:effectRef idx="0">
+              <a:schemeClr val="accent1"/>
+            </a:effectRef>
+            <a:fontRef idx="minor">
+              <a:schemeClr val="lt1"/>
+            </a:fontRef>
+          </p:style>
+          <p:txBody>
+            <a:bodyPr rtlCol="0" anchor="ctr"/>
+            <a:lstStyle/>
+            <a:p>
+              <a:pPr algn="ctr"/>
+              <a:endParaRPr lang="ko-KR" altLang="en-US" dirty="0"/>
+            </a:p>
+          </p:txBody>
+        </p:sp>
+      </p:grpSp>
+      <p:cxnSp>
+        <p:nvCxnSpPr>
+          <p:cNvPr id="16" name="직선 연결선 15">
+            <a:extLst>
+              <a:ext uri="{FF2B5EF4-FFF2-40B4-BE49-F238E27FC236}">
+                <a16:creationId xmlns:a16="http://schemas.microsoft.com/office/drawing/2014/main" id="{AF53238A-E230-41FE-9146-78AB137B027D}"/>
+              </a:ext>
+            </a:extLst>
+          </p:cNvPr>
+          <p:cNvCxnSpPr/>
+          <p:nvPr/>
+        </p:nvCxnSpPr>
+        <p:spPr>
+          <a:xfrm>
+            <a:off x="3780350" y="1673678"/>
+            <a:ext cx="4629150" cy="0"/>
+          </a:xfrm>
+          <a:prstGeom prst="line">
+            <a:avLst/>
+          </a:prstGeom>
+        </p:spPr>
+        <p:style>
+          <a:lnRef idx="1">
+            <a:schemeClr val="accent1"/>
+          </a:lnRef>
+          <a:fillRef idx="0">
+            <a:schemeClr val="accent1"/>
+          </a:fillRef>
+          <a:effectRef idx="0">
+            <a:schemeClr val="accent1"/>
+          </a:effectRef>
+          <a:fontRef idx="minor">
+            <a:schemeClr val="tx1"/>
+          </a:fontRef>
+        </p:style>
+      </p:cxnSp>
+      <p:cxnSp>
+        <p:nvCxnSpPr>
+          <p:cNvPr id="17" name="직선 연결선 16">
+            <a:extLst>
+              <a:ext uri="{FF2B5EF4-FFF2-40B4-BE49-F238E27FC236}">
+                <a16:creationId xmlns:a16="http://schemas.microsoft.com/office/drawing/2014/main" id="{43264BE6-11E9-4AB0-9F9A-5B85F4931755}"/>
+              </a:ext>
+            </a:extLst>
+          </p:cNvPr>
+          <p:cNvCxnSpPr/>
+          <p:nvPr/>
+        </p:nvCxnSpPr>
+        <p:spPr>
+          <a:xfrm>
+            <a:off x="3780350" y="2261508"/>
+            <a:ext cx="4629150" cy="0"/>
+          </a:xfrm>
+          <a:prstGeom prst="line">
+            <a:avLst/>
+          </a:prstGeom>
+        </p:spPr>
+        <p:style>
+          <a:lnRef idx="1">
+            <a:schemeClr val="accent1"/>
+          </a:lnRef>
+          <a:fillRef idx="0">
+            <a:schemeClr val="accent1"/>
+          </a:fillRef>
+          <a:effectRef idx="0">
+            <a:schemeClr val="accent1"/>
+          </a:effectRef>
+          <a:fontRef idx="minor">
+            <a:schemeClr val="tx1"/>
+          </a:fontRef>
+        </p:style>
+      </p:cxnSp>
+      <p:cxnSp>
+        <p:nvCxnSpPr>
+          <p:cNvPr id="19" name="직선 연결선 18">
+            <a:extLst>
+              <a:ext uri="{FF2B5EF4-FFF2-40B4-BE49-F238E27FC236}">
+                <a16:creationId xmlns:a16="http://schemas.microsoft.com/office/drawing/2014/main" id="{BB611CF3-F7DF-4C47-B560-BEFE90E45FF4}"/>
+              </a:ext>
+            </a:extLst>
+          </p:cNvPr>
+          <p:cNvCxnSpPr/>
+          <p:nvPr/>
+        </p:nvCxnSpPr>
+        <p:spPr>
+          <a:xfrm>
+            <a:off x="6739091" y="1545092"/>
+            <a:ext cx="0" cy="857250"/>
+          </a:xfrm>
+          <a:prstGeom prst="line">
+            <a:avLst/>
+          </a:prstGeom>
+        </p:spPr>
+        <p:style>
+          <a:lnRef idx="1">
+            <a:schemeClr val="accent1"/>
+          </a:lnRef>
+          <a:fillRef idx="0">
+            <a:schemeClr val="accent1"/>
+          </a:fillRef>
+          <a:effectRef idx="0">
+            <a:schemeClr val="accent1"/>
+          </a:effectRef>
+          <a:fontRef idx="minor">
+            <a:schemeClr val="tx1"/>
+          </a:fontRef>
+        </p:style>
+      </p:cxnSp>
+      <p:cxnSp>
+        <p:nvCxnSpPr>
+          <p:cNvPr id="21" name="직선 연결선 20">
+            <a:extLst>
+              <a:ext uri="{FF2B5EF4-FFF2-40B4-BE49-F238E27FC236}">
+                <a16:creationId xmlns:a16="http://schemas.microsoft.com/office/drawing/2014/main" id="{F7F45DC0-A25E-44A8-85D4-FC1CC6D28489}"/>
+              </a:ext>
+            </a:extLst>
+          </p:cNvPr>
+          <p:cNvCxnSpPr>
+            <a:cxnSpLocks/>
+          </p:cNvCxnSpPr>
+          <p:nvPr/>
+        </p:nvCxnSpPr>
+        <p:spPr>
+          <a:xfrm>
+            <a:off x="6699515" y="1965553"/>
+            <a:ext cx="1383128" cy="0"/>
+          </a:xfrm>
+          <a:prstGeom prst="line">
+            <a:avLst/>
+          </a:prstGeom>
+        </p:spPr>
+        <p:style>
+          <a:lnRef idx="1">
+            <a:schemeClr val="accent1"/>
+          </a:lnRef>
+          <a:fillRef idx="0">
+            <a:schemeClr val="accent1"/>
+          </a:fillRef>
+          <a:effectRef idx="0">
+            <a:schemeClr val="accent1"/>
+          </a:effectRef>
+          <a:fontRef idx="minor">
+            <a:schemeClr val="tx1"/>
+          </a:fontRef>
+        </p:style>
+      </p:cxnSp>
+    </p:spTree>
+    <p:extLst>
+      <p:ext uri="{BB962C8B-B14F-4D97-AF65-F5344CB8AC3E}">
+        <p14:creationId xmlns:p14="http://schemas.microsoft.com/office/powerpoint/2010/main" val="3540984522"/>
+      </p:ext>
+    </p:extLst>
+  </p:cSld>
+  <p:clrMapOvr>
+    <a:masterClrMapping/>
+  </p:clrMapOvr>
+</p:sld>
+</file>
+
 <file path=ppt/theme/theme1.xml><?xml version="1.0" encoding="utf-8"?>
 <a:theme xmlns:a="http://schemas.openxmlformats.org/drawingml/2006/main" name="Office 테마">
   <a:themeElements>

</xml_diff>